<commit_message>
add folders for each section and readme files
</commit_message>
<xml_diff>
--- a/CourseMaterial/Presentation/What is software, software engineering and software/What is software, software engineering and software.pptx
+++ b/CourseMaterial/Presentation/What is software, software engineering and software/What is software, software engineering and software.pptx
@@ -19,7 +19,9 @@
     <p:sldId id="267" r:id="rId13"/>
     <p:sldId id="268" r:id="rId14"/>
     <p:sldId id="269" r:id="rId15"/>
-    <p:sldId id="270" r:id="rId16"/>
+    <p:sldId id="271" r:id="rId16"/>
+    <p:sldId id="272" r:id="rId17"/>
+    <p:sldId id="270" r:id="rId18"/>
   </p:sldIdLst>
   <p:sldSz cx="12192000" cy="6858000"/>
   <p:notesSz cx="6858000" cy="9144000"/>
@@ -118,6 +120,11 @@
       </a:defRPr>
     </a:lvl9pPr>
   </p:defaultTextStyle>
+  <p:extLst>
+    <p:ext uri="{EFAFB233-063F-42B5-8137-9DF3F51BA10A}">
+      <p15:sldGuideLst xmlns:p15="http://schemas.microsoft.com/office/powerpoint/2012/main"/>
+    </p:ext>
+  </p:extLst>
 </p:presentation>
 </file>
 
@@ -252,7 +259,7 @@
           <a:p>
             <a:fld id="{C4DBCDBE-0135-4B07-95A8-D5351783C3E8}" type="datetimeFigureOut">
               <a:rPr lang="zh-CN" altLang="en-US" smtClean="0"/>
-              <a:t>2018/7/17</a:t>
+              <a:t>2018/8/9</a:t>
             </a:fld>
             <a:endParaRPr lang="zh-CN" altLang="en-US"/>
           </a:p>
@@ -422,7 +429,7 @@
           <a:p>
             <a:fld id="{C4DBCDBE-0135-4B07-95A8-D5351783C3E8}" type="datetimeFigureOut">
               <a:rPr lang="zh-CN" altLang="en-US" smtClean="0"/>
-              <a:t>2018/7/17</a:t>
+              <a:t>2018/8/9</a:t>
             </a:fld>
             <a:endParaRPr lang="zh-CN" altLang="en-US"/>
           </a:p>
@@ -602,7 +609,7 @@
           <a:p>
             <a:fld id="{C4DBCDBE-0135-4B07-95A8-D5351783C3E8}" type="datetimeFigureOut">
               <a:rPr lang="zh-CN" altLang="en-US" smtClean="0"/>
-              <a:t>2018/7/17</a:t>
+              <a:t>2018/8/9</a:t>
             </a:fld>
             <a:endParaRPr lang="zh-CN" altLang="en-US"/>
           </a:p>
@@ -772,7 +779,7 @@
           <a:p>
             <a:fld id="{C4DBCDBE-0135-4B07-95A8-D5351783C3E8}" type="datetimeFigureOut">
               <a:rPr lang="zh-CN" altLang="en-US" smtClean="0"/>
-              <a:t>2018/7/17</a:t>
+              <a:t>2018/8/9</a:t>
             </a:fld>
             <a:endParaRPr lang="zh-CN" altLang="en-US"/>
           </a:p>
@@ -1018,7 +1025,7 @@
           <a:p>
             <a:fld id="{C4DBCDBE-0135-4B07-95A8-D5351783C3E8}" type="datetimeFigureOut">
               <a:rPr lang="zh-CN" altLang="en-US" smtClean="0"/>
-              <a:t>2018/7/17</a:t>
+              <a:t>2018/8/9</a:t>
             </a:fld>
             <a:endParaRPr lang="zh-CN" altLang="en-US"/>
           </a:p>
@@ -1250,7 +1257,7 @@
           <a:p>
             <a:fld id="{C4DBCDBE-0135-4B07-95A8-D5351783C3E8}" type="datetimeFigureOut">
               <a:rPr lang="zh-CN" altLang="en-US" smtClean="0"/>
-              <a:t>2018/7/17</a:t>
+              <a:t>2018/8/9</a:t>
             </a:fld>
             <a:endParaRPr lang="zh-CN" altLang="en-US"/>
           </a:p>
@@ -1617,7 +1624,7 @@
           <a:p>
             <a:fld id="{C4DBCDBE-0135-4B07-95A8-D5351783C3E8}" type="datetimeFigureOut">
               <a:rPr lang="zh-CN" altLang="en-US" smtClean="0"/>
-              <a:t>2018/7/17</a:t>
+              <a:t>2018/8/9</a:t>
             </a:fld>
             <a:endParaRPr lang="zh-CN" altLang="en-US"/>
           </a:p>
@@ -1735,7 +1742,7 @@
           <a:p>
             <a:fld id="{C4DBCDBE-0135-4B07-95A8-D5351783C3E8}" type="datetimeFigureOut">
               <a:rPr lang="zh-CN" altLang="en-US" smtClean="0"/>
-              <a:t>2018/7/17</a:t>
+              <a:t>2018/8/9</a:t>
             </a:fld>
             <a:endParaRPr lang="zh-CN" altLang="en-US"/>
           </a:p>
@@ -1830,7 +1837,7 @@
           <a:p>
             <a:fld id="{C4DBCDBE-0135-4B07-95A8-D5351783C3E8}" type="datetimeFigureOut">
               <a:rPr lang="zh-CN" altLang="en-US" smtClean="0"/>
-              <a:t>2018/7/17</a:t>
+              <a:t>2018/8/9</a:t>
             </a:fld>
             <a:endParaRPr lang="zh-CN" altLang="en-US"/>
           </a:p>
@@ -2107,7 +2114,7 @@
           <a:p>
             <a:fld id="{C4DBCDBE-0135-4B07-95A8-D5351783C3E8}" type="datetimeFigureOut">
               <a:rPr lang="zh-CN" altLang="en-US" smtClean="0"/>
-              <a:t>2018/7/17</a:t>
+              <a:t>2018/8/9</a:t>
             </a:fld>
             <a:endParaRPr lang="zh-CN" altLang="en-US"/>
           </a:p>
@@ -2360,7 +2367,7 @@
           <a:p>
             <a:fld id="{C4DBCDBE-0135-4B07-95A8-D5351783C3E8}" type="datetimeFigureOut">
               <a:rPr lang="zh-CN" altLang="en-US" smtClean="0"/>
-              <a:t>2018/7/17</a:t>
+              <a:t>2018/8/9</a:t>
             </a:fld>
             <a:endParaRPr lang="zh-CN" altLang="en-US"/>
           </a:p>
@@ -2573,7 +2580,7 @@
           <a:p>
             <a:fld id="{C4DBCDBE-0135-4B07-95A8-D5351783C3E8}" type="datetimeFigureOut">
               <a:rPr lang="zh-CN" altLang="en-US" smtClean="0"/>
-              <a:t>2018/7/17</a:t>
+              <a:t>2018/8/9</a:t>
             </a:fld>
             <a:endParaRPr lang="zh-CN" altLang="en-US"/>
           </a:p>
@@ -3588,6 +3595,137 @@
             <p:ph type="title"/>
           </p:nvPr>
         </p:nvSpPr>
+        <p:spPr/>
+        <p:txBody>
+          <a:bodyPr/>
+          <a:lstStyle/>
+          <a:p>
+            <a:r>
+              <a:rPr lang="en-US" altLang="zh-CN" dirty="0" smtClean="0"/>
+              <a:t>Our brains are small.</a:t>
+            </a:r>
+            <a:endParaRPr lang="zh-CN" altLang="en-US" dirty="0"/>
+          </a:p>
+        </p:txBody>
+      </p:sp>
+    </p:spTree>
+    <p:extLst>
+      <p:ext uri="{BB962C8B-B14F-4D97-AF65-F5344CB8AC3E}">
+        <p14:creationId xmlns:p14="http://schemas.microsoft.com/office/powerpoint/2010/main" val="3133851272"/>
+      </p:ext>
+    </p:extLst>
+  </p:cSld>
+  <p:clrMapOvr>
+    <a:masterClrMapping/>
+  </p:clrMapOvr>
+</p:sld>
+</file>
+
+<file path=ppt/slides/slide16.xml><?xml version="1.0" encoding="utf-8"?>
+<p:sld xmlns:a="http://schemas.openxmlformats.org/drawingml/2006/main" xmlns:r="http://schemas.openxmlformats.org/officeDocument/2006/relationships" xmlns:p="http://schemas.openxmlformats.org/presentationml/2006/main">
+  <p:cSld>
+    <p:spTree>
+      <p:nvGrpSpPr>
+        <p:cNvPr id="1" name=""/>
+        <p:cNvGrpSpPr/>
+        <p:nvPr/>
+      </p:nvGrpSpPr>
+      <p:grpSpPr>
+        <a:xfrm>
+          <a:off x="0" y="0"/>
+          <a:ext cx="0" cy="0"/>
+          <a:chOff x="0" y="0"/>
+          <a:chExt cx="0" cy="0"/>
+        </a:xfrm>
+      </p:grpSpPr>
+      <p:sp>
+        <p:nvSpPr>
+          <p:cNvPr id="2" name="标题 1"/>
+          <p:cNvSpPr>
+            <a:spLocks noGrp="1"/>
+          </p:cNvSpPr>
+          <p:nvPr>
+            <p:ph type="title"/>
+          </p:nvPr>
+        </p:nvSpPr>
+        <p:spPr/>
+        <p:txBody>
+          <a:bodyPr/>
+          <a:lstStyle/>
+          <a:p>
+            <a:endParaRPr lang="zh-CN" altLang="en-US" dirty="0"/>
+          </a:p>
+        </p:txBody>
+      </p:sp>
+      <p:sp>
+        <p:nvSpPr>
+          <p:cNvPr id="3" name="内容占位符 2"/>
+          <p:cNvSpPr>
+            <a:spLocks noGrp="1"/>
+          </p:cNvSpPr>
+          <p:nvPr>
+            <p:ph idx="1"/>
+          </p:nvPr>
+        </p:nvSpPr>
+        <p:spPr/>
+        <p:txBody>
+          <a:bodyPr/>
+          <a:lstStyle/>
+          <a:p>
+            <a:r>
+              <a:rPr lang="en-US" altLang="zh-CN" dirty="0" smtClean="0"/>
+              <a:t>There is not silver bullet in software engineering.</a:t>
+            </a:r>
+          </a:p>
+          <a:p>
+            <a:r>
+              <a:rPr lang="en-US" altLang="zh-CN" dirty="0" smtClean="0"/>
+              <a:t>I am not here to tell you what to do.</a:t>
+            </a:r>
+            <a:endParaRPr lang="zh-CN" altLang="en-US" dirty="0"/>
+          </a:p>
+        </p:txBody>
+      </p:sp>
+    </p:spTree>
+    <p:extLst>
+      <p:ext uri="{BB962C8B-B14F-4D97-AF65-F5344CB8AC3E}">
+        <p14:creationId xmlns:p14="http://schemas.microsoft.com/office/powerpoint/2010/main" val="826728578"/>
+      </p:ext>
+    </p:extLst>
+  </p:cSld>
+  <p:clrMapOvr>
+    <a:masterClrMapping/>
+  </p:clrMapOvr>
+</p:sld>
+</file>
+
+<file path=ppt/slides/slide17.xml><?xml version="1.0" encoding="utf-8"?>
+<p:sld xmlns:a="http://schemas.openxmlformats.org/drawingml/2006/main" xmlns:r="http://schemas.openxmlformats.org/officeDocument/2006/relationships" xmlns:p="http://schemas.openxmlformats.org/presentationml/2006/main">
+  <p:cSld>
+    <p:spTree>
+      <p:nvGrpSpPr>
+        <p:cNvPr id="1" name=""/>
+        <p:cNvGrpSpPr/>
+        <p:nvPr/>
+      </p:nvGrpSpPr>
+      <p:grpSpPr>
+        <a:xfrm>
+          <a:off x="0" y="0"/>
+          <a:ext cx="0" cy="0"/>
+          <a:chOff x="0" y="0"/>
+          <a:chExt cx="0" cy="0"/>
+        </a:xfrm>
+      </p:grpSpPr>
+      <p:sp>
+        <p:nvSpPr>
+          <p:cNvPr id="2" name="标题 1"/>
+          <p:cNvSpPr>
+            <a:spLocks noGrp="1"/>
+          </p:cNvSpPr>
+          <p:nvPr>
+            <p:ph type="title"/>
+          </p:nvPr>
+        </p:nvSpPr>
         <p:spPr>
           <a:xfrm>
             <a:off x="947202" y="1703418"/>

</xml_diff>